<commit_message>
1.1 PESPI => EPI
</commit_message>
<xml_diff>
--- a/open-banking-wallet.pptx
+++ b/open-banking-wallet.pptx
@@ -149,11 +149,15 @@
           <a:p>
             <a:r>
               <a:rPr lang="en-US" sz="1000" dirty="0" smtClean="0"/>
-              <a:t>Version 1.0,</a:t>
+              <a:t>Version </a:t>
+            </a:r>
+            <a:r>
+              <a:rPr lang="en-US" sz="1000" dirty="0" smtClean="0"/>
+              <a:t>1.1,</a:t>
             </a:r>
             <a:r>
               <a:rPr lang="en-US" sz="1000" baseline="0" dirty="0" smtClean="0"/>
-              <a:t> 2020-02-27</a:t>
+              <a:t> 2020-03-04</a:t>
             </a:r>
             <a:endParaRPr lang="en-US" sz="1000" dirty="0"/>
           </a:p>
@@ -199,6 +203,13 @@
   <p:clrMapOvr>
     <a:masterClrMapping/>
   </p:clrMapOvr>
+  <p:timing>
+    <p:tnLst>
+      <p:par>
+        <p:cTn id="1" dur="indefinite" restart="never" nodeType="tmRoot"/>
+      </p:par>
+    </p:tnLst>
+  </p:timing>
 </p:sldLayout>
 </file>
 
@@ -383,7 +394,7 @@
           <a:p>
             <a:fld id="{25CDB53B-B7C6-4811-AFF5-70E6DA56A58E}" type="datetimeFigureOut">
               <a:rPr lang="en-US" smtClean="0"/>
-              <a:t>2020-02-27</a:t>
+              <a:t>2020-03-04</a:t>
             </a:fld>
             <a:endParaRPr lang="en-US"/>
           </a:p>
@@ -596,7 +607,7 @@
           <a:p>
             <a:fld id="{25CDB53B-B7C6-4811-AFF5-70E6DA56A58E}" type="datetimeFigureOut">
               <a:rPr lang="en-US" smtClean="0"/>
-              <a:t>2020-02-27</a:t>
+              <a:t>2020-03-04</a:t>
             </a:fld>
             <a:endParaRPr lang="en-US"/>
           </a:p>
@@ -1112,7 +1123,23 @@
             </a:pPr>
             <a:r>
               <a:rPr lang="en-US" sz="2200" dirty="0" smtClean="0"/>
-              <a:t>Currently available in beta for Android</a:t>
+              <a:t>Currently available </a:t>
+            </a:r>
+            <a:r>
+              <a:rPr lang="en-US" sz="2200" dirty="0" smtClean="0"/>
+              <a:t>for</a:t>
+            </a:r>
+            <a:r>
+              <a:rPr lang="en-US" sz="2200" dirty="0" smtClean="0"/>
+              <a:t> public </a:t>
+            </a:r>
+            <a:r>
+              <a:rPr lang="en-US" sz="2200" smtClean="0"/>
+              <a:t>testing using </a:t>
+            </a:r>
+            <a:r>
+              <a:rPr lang="en-US" sz="2200" dirty="0" smtClean="0"/>
+              <a:t>Android</a:t>
             </a:r>
           </a:p>
           <a:p>
@@ -1267,7 +1294,15 @@
           <a:p>
             <a:r>
               <a:rPr lang="en-US" sz="2200" dirty="0" smtClean="0"/>
-              <a:t>Designed for compatibility with ECB/PEPSI and EMPSA goals.</a:t>
+              <a:t>Designed for compatibility with </a:t>
+            </a:r>
+            <a:r>
+              <a:rPr lang="en-US" sz="2200" dirty="0" smtClean="0"/>
+              <a:t>ECB/EPI </a:t>
+            </a:r>
+            <a:r>
+              <a:rPr lang="en-US" sz="2200" dirty="0" smtClean="0"/>
+              <a:t>and EMPSA goals.</a:t>
             </a:r>
           </a:p>
           <a:p>
@@ -1845,21 +1880,7 @@
                 <a:latin typeface="Arial" panose="020B0604020202020204" pitchFamily="34" charset="0"/>
                 <a:cs typeface="Arial" panose="020B0604020202020204" pitchFamily="34" charset="0"/>
               </a:rPr>
-              <a:t> High level End-to-End </a:t>
-            </a:r>
-            <a:r>
-              <a:rPr lang="en-US" sz="1400" dirty="0" smtClean="0">
-                <a:latin typeface="Arial" panose="020B0604020202020204" pitchFamily="34" charset="0"/>
-                <a:cs typeface="Arial" panose="020B0604020202020204" pitchFamily="34" charset="0"/>
-              </a:rPr>
-              <a:t>Secured JSON based Web </a:t>
-            </a:r>
-            <a:r>
-              <a:rPr lang="en-US" sz="1400" dirty="0" smtClean="0">
-                <a:latin typeface="Arial" panose="020B0604020202020204" pitchFamily="34" charset="0"/>
-                <a:cs typeface="Arial" panose="020B0604020202020204" pitchFamily="34" charset="0"/>
-              </a:rPr>
-              <a:t>Protocol</a:t>
+              <a:t> High level End-to-End Secured JSON based Web Protocol</a:t>
             </a:r>
             <a:endParaRPr lang="en-US" sz="1400" dirty="0">
               <a:latin typeface="Arial" panose="020B0604020202020204" pitchFamily="34" charset="0"/>

</xml_diff>

<commit_message>
1.3 "Total" instead of "Amount"
</commit_message>
<xml_diff>
--- a/open-banking-wallet.pptx
+++ b/open-banking-wallet.pptx
@@ -153,11 +153,11 @@
             </a:r>
             <a:r>
               <a:rPr lang="en-US" sz="1000" dirty="0" smtClean="0"/>
-              <a:t>1.2,</a:t>
+              <a:t>1.3,</a:t>
             </a:r>
             <a:r>
               <a:rPr lang="en-US" sz="1000" baseline="0" dirty="0" smtClean="0"/>
-              <a:t> 2020-03-31</a:t>
+              <a:t> 2020-04-18</a:t>
             </a:r>
             <a:endParaRPr lang="en-US" sz="1000" dirty="0"/>
           </a:p>
@@ -394,7 +394,7 @@
           <a:p>
             <a:fld id="{25CDB53B-B7C6-4811-AFF5-70E6DA56A58E}" type="datetimeFigureOut">
               <a:rPr lang="en-US" smtClean="0"/>
-              <a:t>2020-04-01</a:t>
+              <a:t>2020-04-18</a:t>
             </a:fld>
             <a:endParaRPr lang="en-US"/>
           </a:p>
@@ -607,7 +607,7 @@
           <a:p>
             <a:fld id="{25CDB53B-B7C6-4811-AFF5-70E6DA56A58E}" type="datetimeFigureOut">
               <a:rPr lang="en-US" smtClean="0"/>
-              <a:t>2020-04-01</a:t>
+              <a:t>2020-04-18</a:t>
             </a:fld>
             <a:endParaRPr lang="en-US"/>
           </a:p>
@@ -1330,65 +1330,6 @@
           </a:p>
         </p:txBody>
       </p:sp>
-      <p:sp>
-        <p:nvSpPr>
-          <p:cNvPr id="2" name="12-Point Star 1"/>
-          <p:cNvSpPr/>
-          <p:nvPr/>
-        </p:nvSpPr>
-        <p:spPr>
-          <a:xfrm>
-            <a:off x="8267133" y="3666505"/>
-            <a:ext cx="485524" cy="498659"/>
-          </a:xfrm>
-          <a:prstGeom prst="star12">
-            <a:avLst>
-              <a:gd name="adj" fmla="val 22312"/>
-            </a:avLst>
-          </a:prstGeom>
-          <a:solidFill>
-            <a:srgbClr val="FFFF00"/>
-          </a:solidFill>
-          <a:ln w="12700">
-            <a:solidFill>
-              <a:schemeClr val="accent6">
-                <a:lumMod val="50000"/>
-              </a:schemeClr>
-            </a:solidFill>
-          </a:ln>
-          <a:effectLst>
-            <a:outerShdw blurRad="50800" dist="38100" dir="2700000" algn="tl" rotWithShape="0">
-              <a:prstClr val="black">
-                <a:alpha val="40000"/>
-              </a:prstClr>
-            </a:outerShdw>
-          </a:effectLst>
-        </p:spPr>
-        <p:style>
-          <a:lnRef idx="2">
-            <a:schemeClr val="accent1">
-              <a:shade val="50000"/>
-            </a:schemeClr>
-          </a:lnRef>
-          <a:fillRef idx="1">
-            <a:schemeClr val="accent1"/>
-          </a:fillRef>
-          <a:effectRef idx="0">
-            <a:schemeClr val="accent1"/>
-          </a:effectRef>
-          <a:fontRef idx="minor">
-            <a:schemeClr val="lt1"/>
-          </a:fontRef>
-        </p:style>
-        <p:txBody>
-          <a:bodyPr rtlCol="0" anchor="ctr"/>
-          <a:lstStyle/>
-          <a:p>
-            <a:pPr algn="ctr"/>
-            <a:endParaRPr lang="en-US"/>
-          </a:p>
-        </p:txBody>
-      </p:sp>
     </p:spTree>
     <p:extLst>
       <p:ext uri="{BB962C8B-B14F-4D97-AF65-F5344CB8AC3E}">
@@ -1686,7 +1627,7 @@
       </p:grpSp>
       <p:pic>
         <p:nvPicPr>
-          <p:cNvPr id="5" name="Picture 4"/>
+          <p:cNvPr id="8" name="Picture 7"/>
           <p:cNvPicPr>
             <a:picLocks noChangeAspect="1"/>
           </p:cNvPicPr>
@@ -1706,7 +1647,7 @@
         </p:blipFill>
         <p:spPr>
           <a:xfrm>
-            <a:off x="2541537" y="1939836"/>
+            <a:off x="2543869" y="1930653"/>
             <a:ext cx="2314375" cy="4114999"/>
           </a:xfrm>
           <a:prstGeom prst="rect">
@@ -1715,7 +1656,7 @@
           <a:ln>
             <a:solidFill>
               <a:schemeClr val="bg1">
-                <a:lumMod val="65000"/>
+                <a:lumMod val="50000"/>
               </a:schemeClr>
             </a:solidFill>
           </a:ln>
@@ -2154,8 +2095,8 @@
         </p:nvCxnSpPr>
         <p:spPr>
           <a:xfrm flipH="1">
-            <a:off x="4607937" y="3075056"/>
-            <a:ext cx="468000" cy="0"/>
+            <a:off x="4247937" y="3219357"/>
+            <a:ext cx="828000" cy="0"/>
           </a:xfrm>
           <a:prstGeom prst="straightConnector1">
             <a:avLst/>
@@ -2192,7 +2133,7 @@
         </p:nvSpPr>
         <p:spPr>
           <a:xfrm>
-            <a:off x="5048513" y="2834648"/>
+            <a:off x="5048513" y="2978949"/>
             <a:ext cx="2691839" cy="954107"/>
           </a:xfrm>
           <a:prstGeom prst="rect">
@@ -2256,7 +2197,6 @@
               <a:rPr lang="en-US" sz="1400" dirty="0"/>
               <a:t>)</a:t>
             </a:r>
-            <a:endParaRPr lang="en-US" sz="1400" dirty="0"/>
           </a:p>
           <a:p>
             <a:endParaRPr lang="en-US" sz="1400" dirty="0" smtClean="0"/>
@@ -2277,7 +2217,7 @@
         </p:nvCxnSpPr>
         <p:spPr>
           <a:xfrm flipH="1">
-            <a:off x="4247937" y="3665800"/>
+            <a:off x="4247937" y="3646748"/>
             <a:ext cx="828000" cy="0"/>
           </a:xfrm>
           <a:prstGeom prst="straightConnector1">
@@ -2315,7 +2255,7 @@
         </p:nvSpPr>
         <p:spPr>
           <a:xfrm>
-            <a:off x="5048512" y="3513077"/>
+            <a:off x="5048512" y="3494025"/>
             <a:ext cx="2619833" cy="307777"/>
           </a:xfrm>
           <a:prstGeom prst="rect">
@@ -2504,7 +2444,7 @@
         <p:spPr>
           <a:xfrm>
             <a:off x="5048513" y="3913388"/>
-            <a:ext cx="1588897" cy="1169551"/>
+            <a:ext cx="1588897" cy="1384995"/>
           </a:xfrm>
           <a:prstGeom prst="rect">
             <a:avLst/>
@@ -2565,8 +2505,32 @@
                 <a:latin typeface="Arial" panose="020B0604020202020204" pitchFamily="34" charset="0"/>
                 <a:cs typeface="Arial" panose="020B0604020202020204" pitchFamily="34" charset="0"/>
               </a:rPr>
-              <a:t>Gas Station</a:t>
-            </a:r>
+              <a:t>Gas </a:t>
+            </a:r>
+            <a:r>
+              <a:rPr lang="en-US" sz="1400" dirty="0" smtClean="0">
+                <a:latin typeface="Arial" panose="020B0604020202020204" pitchFamily="34" charset="0"/>
+                <a:cs typeface="Arial" panose="020B0604020202020204" pitchFamily="34" charset="0"/>
+              </a:rPr>
+              <a:t>Station</a:t>
+            </a:r>
+          </a:p>
+          <a:p>
+            <a:pPr marL="177800" indent="-177800">
+              <a:buFont typeface="Arial" panose="020B0604020202020204" pitchFamily="34" charset="0"/>
+              <a:buChar char="•"/>
+            </a:pPr>
+            <a:r>
+              <a:rPr lang="en-US" sz="1400" dirty="0" smtClean="0">
+                <a:latin typeface="Arial" panose="020B0604020202020204" pitchFamily="34" charset="0"/>
+                <a:cs typeface="Arial" panose="020B0604020202020204" pitchFamily="34" charset="0"/>
+              </a:rPr>
+              <a:t>Subscription</a:t>
+            </a:r>
+            <a:endParaRPr lang="en-US" sz="1400" dirty="0" smtClean="0">
+              <a:latin typeface="Arial" panose="020B0604020202020204" pitchFamily="34" charset="0"/>
+              <a:cs typeface="Arial" panose="020B0604020202020204" pitchFamily="34" charset="0"/>
+            </a:endParaRPr>
           </a:p>
           <a:p>
             <a:pPr marL="177800" indent="-177800">
@@ -2662,14 +2626,7 @@
                   <a:latin typeface="Arial" panose="020B0604020202020204" pitchFamily="34" charset="0"/>
                   <a:cs typeface="Arial" panose="020B0604020202020204" pitchFamily="34" charset="0"/>
                 </a:rPr>
-                <a:t>(as defined </a:t>
-              </a:r>
-              <a:r>
-                <a:rPr lang="en-US" sz="1200" dirty="0" smtClean="0">
-                  <a:latin typeface="Arial" panose="020B0604020202020204" pitchFamily="34" charset="0"/>
-                  <a:cs typeface="Arial" panose="020B0604020202020204" pitchFamily="34" charset="0"/>
-                </a:rPr>
-                <a:t>by the </a:t>
+                <a:t>(as defined by the </a:t>
               </a:r>
               <a:r>
                 <a:rPr lang="en-US" sz="1200" i="1" dirty="0" smtClean="0">
@@ -3330,46 +3287,6 @@
           </a:p>
         </p:txBody>
       </p:sp>
-      <p:pic>
-        <p:nvPicPr>
-          <p:cNvPr id="6" name="Picture 5"/>
-          <p:cNvPicPr>
-            <a:picLocks noChangeAspect="1"/>
-          </p:cNvPicPr>
-          <p:nvPr/>
-        </p:nvPicPr>
-        <p:blipFill>
-          <a:blip r:embed="rId5" cstate="print">
-            <a:extLst>
-              <a:ext uri="{28A0092B-C50C-407E-A947-70E740481C1C}">
-                <a14:useLocalDpi xmlns:a14="http://schemas.microsoft.com/office/drawing/2010/main" val="0"/>
-              </a:ext>
-            </a:extLst>
-          </a:blip>
-          <a:stretch>
-            <a:fillRect/>
-          </a:stretch>
-        </p:blipFill>
-        <p:spPr>
-          <a:xfrm>
-            <a:off x="6924675" y="4405361"/>
-            <a:ext cx="1487340" cy="625797"/>
-          </a:xfrm>
-          <a:prstGeom prst="rect">
-            <a:avLst/>
-          </a:prstGeom>
-          <a:ln>
-            <a:noFill/>
-          </a:ln>
-          <a:effectLst>
-            <a:outerShdw blurRad="50800" dist="38100" dir="2700000" algn="tl" rotWithShape="0">
-              <a:prstClr val="black">
-                <a:alpha val="40000"/>
-              </a:prstClr>
-            </a:outerShdw>
-          </a:effectLst>
-        </p:spPr>
-      </p:pic>
       <p:sp>
         <p:nvSpPr>
           <p:cNvPr id="7" name="Rectangle 6"/>
@@ -3379,7 +3296,7 @@
         <p:spPr>
           <a:xfrm>
             <a:off x="6804249" y="4283463"/>
-            <a:ext cx="1728192" cy="873729"/>
+            <a:ext cx="1687289" cy="873729"/>
           </a:xfrm>
           <a:prstGeom prst="rect">
             <a:avLst/>
@@ -3426,8 +3343,8 @@
         </p:nvCxnSpPr>
         <p:spPr>
           <a:xfrm>
-            <a:off x="6358428" y="4718259"/>
-            <a:ext cx="445821" cy="2069"/>
+            <a:off x="6372200" y="4720328"/>
+            <a:ext cx="432049" cy="0"/>
           </a:xfrm>
           <a:prstGeom prst="line">
             <a:avLst/>
@@ -3448,6 +3365,42 @@
           </a:fontRef>
         </p:style>
       </p:cxnSp>
+      <p:pic>
+        <p:nvPicPr>
+          <p:cNvPr id="37" name="Picture 36"/>
+          <p:cNvPicPr>
+            <a:picLocks noChangeAspect="1"/>
+          </p:cNvPicPr>
+          <p:nvPr/>
+        </p:nvPicPr>
+        <p:blipFill rotWithShape="1">
+          <a:blip r:embed="rId5" cstate="print">
+            <a:extLst>
+              <a:ext uri="{28A0092B-C50C-407E-A947-70E740481C1C}">
+                <a14:useLocalDpi xmlns:a14="http://schemas.microsoft.com/office/drawing/2010/main" val="0"/>
+              </a:ext>
+            </a:extLst>
+          </a:blip>
+          <a:srcRect l="13494" t="45484" r="24288" b="38768"/>
+          <a:stretch/>
+        </p:blipFill>
+        <p:spPr>
+          <a:xfrm>
+            <a:off x="6931678" y="4395429"/>
+            <a:ext cx="1440000" cy="648000"/>
+          </a:xfrm>
+          <a:prstGeom prst="rect">
+            <a:avLst/>
+          </a:prstGeom>
+          <a:effectLst>
+            <a:outerShdw blurRad="50800" dist="38100" dir="2700000" algn="tl" rotWithShape="0">
+              <a:prstClr val="black">
+                <a:alpha val="40000"/>
+              </a:prstClr>
+            </a:outerShdw>
+          </a:effectLst>
+        </p:spPr>
+      </p:pic>
     </p:spTree>
     <p:extLst>
       <p:ext uri="{BB962C8B-B14F-4D97-AF65-F5344CB8AC3E}">

</xml_diff>